<commit_message>
Fix in PowerPoint slides
</commit_message>
<xml_diff>
--- a/slides/Projeto Maia.pptx
+++ b/slides/Projeto Maia.pptx
@@ -8593,22 +8593,6 @@
                 </a:solidFill>
               </a:rPr>
               <a:t> Meet e utiliza o </a:t>
-            </a:r>
-            <a:r>
-              <a:rPr lang="pt-BR" dirty="0" err="1">
-                <a:solidFill>
-                  <a:srgbClr val="FFFF00"/>
-                </a:solidFill>
-              </a:rPr>
-              <a:t>Jitsi</a:t>
-            </a:r>
-            <a:r>
-              <a:rPr lang="pt-BR" dirty="0">
-                <a:solidFill>
-                  <a:srgbClr val="FFFF00"/>
-                </a:solidFill>
-              </a:rPr>
-              <a:t> </a:t>
             </a:r>
             <a:r>
               <a:rPr lang="pt-BR" dirty="0" err="1">

</xml_diff>